<commit_message>
improved wording on issues slide
</commit_message>
<xml_diff>
--- a/Course Merge.pptx
+++ b/Course Merge.pptx
@@ -303,7 +303,7 @@
           <a:p>
             <a:fld id="{63968472-77CE-D540-9444-9997F73DFBDC}" type="datetimeFigureOut">
               <a:rPr lang="en-US" smtClean="0"/>
-              <a:t>7/7/13</a:t>
+              <a:t>7/9/13</a:t>
             </a:fld>
             <a:endParaRPr lang="en-US"/>
           </a:p>
@@ -473,7 +473,7 @@
           <a:p>
             <a:fld id="{63968472-77CE-D540-9444-9997F73DFBDC}" type="datetimeFigureOut">
               <a:rPr lang="en-US" smtClean="0"/>
-              <a:t>7/7/13</a:t>
+              <a:t>7/9/13</a:t>
             </a:fld>
             <a:endParaRPr lang="en-US"/>
           </a:p>
@@ -653,7 +653,7 @@
           <a:p>
             <a:fld id="{63968472-77CE-D540-9444-9997F73DFBDC}" type="datetimeFigureOut">
               <a:rPr lang="en-US" smtClean="0"/>
-              <a:t>7/7/13</a:t>
+              <a:t>7/9/13</a:t>
             </a:fld>
             <a:endParaRPr lang="en-US"/>
           </a:p>
@@ -823,7 +823,7 @@
           <a:p>
             <a:fld id="{63968472-77CE-D540-9444-9997F73DFBDC}" type="datetimeFigureOut">
               <a:rPr lang="en-US" smtClean="0"/>
-              <a:t>7/7/13</a:t>
+              <a:t>7/9/13</a:t>
             </a:fld>
             <a:endParaRPr lang="en-US"/>
           </a:p>
@@ -1069,7 +1069,7 @@
           <a:p>
             <a:fld id="{63968472-77CE-D540-9444-9997F73DFBDC}" type="datetimeFigureOut">
               <a:rPr lang="en-US" smtClean="0"/>
-              <a:t>7/7/13</a:t>
+              <a:t>7/9/13</a:t>
             </a:fld>
             <a:endParaRPr lang="en-US"/>
           </a:p>
@@ -1357,7 +1357,7 @@
           <a:p>
             <a:fld id="{63968472-77CE-D540-9444-9997F73DFBDC}" type="datetimeFigureOut">
               <a:rPr lang="en-US" smtClean="0"/>
-              <a:t>7/7/13</a:t>
+              <a:t>7/9/13</a:t>
             </a:fld>
             <a:endParaRPr lang="en-US"/>
           </a:p>
@@ -1779,7 +1779,7 @@
           <a:p>
             <a:fld id="{63968472-77CE-D540-9444-9997F73DFBDC}" type="datetimeFigureOut">
               <a:rPr lang="en-US" smtClean="0"/>
-              <a:t>7/7/13</a:t>
+              <a:t>7/9/13</a:t>
             </a:fld>
             <a:endParaRPr lang="en-US"/>
           </a:p>
@@ -1897,7 +1897,7 @@
           <a:p>
             <a:fld id="{63968472-77CE-D540-9444-9997F73DFBDC}" type="datetimeFigureOut">
               <a:rPr lang="en-US" smtClean="0"/>
-              <a:t>7/7/13</a:t>
+              <a:t>7/9/13</a:t>
             </a:fld>
             <a:endParaRPr lang="en-US"/>
           </a:p>
@@ -1992,7 +1992,7 @@
           <a:p>
             <a:fld id="{63968472-77CE-D540-9444-9997F73DFBDC}" type="datetimeFigureOut">
               <a:rPr lang="en-US" smtClean="0"/>
-              <a:t>7/7/13</a:t>
+              <a:t>7/9/13</a:t>
             </a:fld>
             <a:endParaRPr lang="en-US"/>
           </a:p>
@@ -2269,7 +2269,7 @@
           <a:p>
             <a:fld id="{63968472-77CE-D540-9444-9997F73DFBDC}" type="datetimeFigureOut">
               <a:rPr lang="en-US" smtClean="0"/>
-              <a:t>7/7/13</a:t>
+              <a:t>7/9/13</a:t>
             </a:fld>
             <a:endParaRPr lang="en-US"/>
           </a:p>
@@ -2522,7 +2522,7 @@
           <a:p>
             <a:fld id="{63968472-77CE-D540-9444-9997F73DFBDC}" type="datetimeFigureOut">
               <a:rPr lang="en-US" smtClean="0"/>
-              <a:t>7/7/13</a:t>
+              <a:t>7/9/13</a:t>
             </a:fld>
             <a:endParaRPr lang="en-US"/>
           </a:p>
@@ -2735,7 +2735,7 @@
           <a:p>
             <a:fld id="{63968472-77CE-D540-9444-9997F73DFBDC}" type="datetimeFigureOut">
               <a:rPr lang="en-US" smtClean="0"/>
-              <a:t>7/7/13</a:t>
+              <a:t>7/9/13</a:t>
             </a:fld>
             <a:endParaRPr lang="en-US"/>
           </a:p>
@@ -3120,7 +3120,12 @@
             <p:ph type="ctrTitle"/>
           </p:nvPr>
         </p:nvSpPr>
-        <p:spPr/>
+        <p:spPr>
+          <a:xfrm>
+            <a:off x="685800" y="793501"/>
+            <a:ext cx="7772400" cy="1470025"/>
+          </a:xfrm>
+        </p:spPr>
         <p:txBody>
           <a:bodyPr/>
           <a:lstStyle/>
@@ -3142,9 +3147,16 @@
             <p:ph type="subTitle" idx="1"/>
           </p:nvPr>
         </p:nvSpPr>
-        <p:spPr/>
-        <p:txBody>
-          <a:bodyPr/>
+        <p:spPr>
+          <a:xfrm>
+            <a:off x="1371600" y="3009900"/>
+            <a:ext cx="6400800" cy="1752600"/>
+          </a:xfrm>
+        </p:spPr>
+        <p:txBody>
+          <a:bodyPr>
+            <a:normAutofit/>
+          </a:bodyPr>
           <a:lstStyle/>
           <a:p>
             <a:r>
@@ -3157,6 +3169,22 @@
               <a:rPr lang="en-US" dirty="0" smtClean="0"/>
               <a:t>University of Kansas</a:t>
             </a:r>
+          </a:p>
+          <a:p>
+            <a:r>
+              <a:rPr lang="en-US" sz="2200" dirty="0"/>
+              <a:t>https://</a:t>
+            </a:r>
+            <a:r>
+              <a:rPr lang="en-US" sz="2200" dirty="0" err="1"/>
+              <a:t>github.com</a:t>
+            </a:r>
+            <a:r>
+              <a:rPr lang="en-US" sz="2200" dirty="0"/>
+              <a:t>/phillips1021/bbdevcon13</a:t>
+            </a:r>
+          </a:p>
+          <a:p>
             <a:endParaRPr lang="en-US" dirty="0"/>
           </a:p>
         </p:txBody>
@@ -3685,7 +3713,15 @@
           <a:p>
             <a:r>
               <a:rPr lang="en-US" dirty="0" smtClean="0"/>
-              <a:t>If the person in the child course is already in the parent course then the child_crsmain_pk1 value is updated in the </a:t>
+              <a:t>If the person in the child course is already in the parent course then the child_crsmain_pk1 value </a:t>
+            </a:r>
+            <a:r>
+              <a:rPr lang="en-US" dirty="0" smtClean="0"/>
+              <a:t>is NOT </a:t>
+            </a:r>
+            <a:r>
+              <a:rPr lang="en-US" dirty="0" smtClean="0"/>
+              <a:t>updated in the </a:t>
             </a:r>
             <a:r>
               <a:rPr lang="en-US" dirty="0" err="1" smtClean="0"/>
@@ -3772,39 +3808,66 @@
         <p:spPr/>
         <p:txBody>
           <a:bodyPr>
-            <a:normAutofit fontScale="92500" lnSpcReduction="20000"/>
+            <a:normAutofit fontScale="85000" lnSpcReduction="10000"/>
           </a:bodyPr>
           <a:lstStyle/>
           <a:p>
             <a:r>
               <a:rPr lang="en-US" dirty="0" smtClean="0"/>
-              <a:t>Parent course enrollments not correctly updated when courses are merged</a:t>
-            </a:r>
-          </a:p>
-          <a:p>
-            <a:r>
-              <a:rPr lang="en-US" dirty="0" smtClean="0"/>
-              <a:t>Child course enrollments are not correctly updated after courses are merged</a:t>
-            </a:r>
-          </a:p>
-          <a:p>
-            <a:r>
-              <a:rPr lang="en-US" dirty="0" smtClean="0"/>
-              <a:t>Student can be in multiple child courses but the merged enrollments can track only one child course</a:t>
-            </a:r>
-          </a:p>
-          <a:p>
-            <a:r>
-              <a:rPr lang="en-US" dirty="0" smtClean="0"/>
-              <a:t>What happens when students enrolled in a course that is merged </a:t>
-            </a:r>
-            <a:r>
-              <a:rPr lang="en-US" dirty="0" smtClean="0"/>
-              <a:t>drops </a:t>
-            </a:r>
-            <a:r>
-              <a:rPr lang="en-US" dirty="0" smtClean="0"/>
-              <a:t>either the parent or child course or both in Student Information System?</a:t>
+              <a:t>Some parent </a:t>
+            </a:r>
+            <a:r>
+              <a:rPr lang="en-US" dirty="0" smtClean="0"/>
+              <a:t>course enrollments </a:t>
+            </a:r>
+            <a:r>
+              <a:rPr lang="en-US" dirty="0" smtClean="0"/>
+              <a:t>not </a:t>
+            </a:r>
+            <a:r>
+              <a:rPr lang="en-US" dirty="0" smtClean="0"/>
+              <a:t>correctly updated when courses are </a:t>
+            </a:r>
+            <a:r>
+              <a:rPr lang="en-US" dirty="0" smtClean="0"/>
+              <a:t>merged (SP 9)</a:t>
+            </a:r>
+            <a:endParaRPr lang="en-US" dirty="0" smtClean="0"/>
+          </a:p>
+          <a:p>
+            <a:r>
+              <a:rPr lang="en-US" dirty="0" smtClean="0"/>
+              <a:t>Some future child </a:t>
+            </a:r>
+            <a:r>
+              <a:rPr lang="en-US" dirty="0" smtClean="0"/>
+              <a:t>course enrollments are not correctly updated after courses are </a:t>
+            </a:r>
+            <a:r>
+              <a:rPr lang="en-US" dirty="0" smtClean="0"/>
+              <a:t>merged (SP 9-12)</a:t>
+            </a:r>
+            <a:endParaRPr lang="en-US" dirty="0" smtClean="0"/>
+          </a:p>
+          <a:p>
+            <a:r>
+              <a:rPr lang="en-US" dirty="0" smtClean="0"/>
+              <a:t>Student can be in multiple child courses but the merged enrollments can track only one child </a:t>
+            </a:r>
+            <a:r>
+              <a:rPr lang="en-US" dirty="0" smtClean="0"/>
+              <a:t>course (SP 9-12)</a:t>
+            </a:r>
+            <a:endParaRPr lang="en-US" dirty="0" smtClean="0"/>
+          </a:p>
+          <a:p>
+            <a:r>
+              <a:rPr lang="en-US" dirty="0" smtClean="0"/>
+              <a:t>What happens when students enrolled in a course that is merged drops either the parent or child course or both in Student Information System</a:t>
+            </a:r>
+            <a:r>
+              <a:rPr lang="en-US" dirty="0" smtClean="0"/>
+              <a:t>? (bug in SP 9, fixed in SP 12)</a:t>
             </a:r>
             <a:endParaRPr lang="en-US" dirty="0"/>
           </a:p>
@@ -4273,11 +4336,7 @@
           <a:p>
             <a:r>
               <a:rPr lang="en-US" dirty="0" smtClean="0"/>
-              <a:t>Having </a:t>
-            </a:r>
-            <a:r>
-              <a:rPr lang="en-US" dirty="0" smtClean="0"/>
-              <a:t>Blackboard administrator do all merges is not supportable due to volume and timeliness</a:t>
+              <a:t>Having Blackboard administrator do all merges is not supportable due to volume and timeliness</a:t>
             </a:r>
             <a:endParaRPr lang="en-US" dirty="0"/>
           </a:p>

</xml_diff>